<commit_message>
Minor fixes and comments
</commit_message>
<xml_diff>
--- a/Courses/Software-Sciences/IT-Module-3-Web-Design/01-Websites/01-Websites.pptx
+++ b/Courses/Software-Sciences/IT-Module-3-Web-Design/01-Websites/01-Websites.pptx
@@ -5,10 +5,10 @@
     <p:sldMasterId id="2147483675" r:id="rId1"/>
   </p:sldMasterIdLst>
   <p:notesMasterIdLst>
-    <p:notesMasterId r:id="rId42"/>
+    <p:notesMasterId r:id="rId43"/>
   </p:notesMasterIdLst>
   <p:handoutMasterIdLst>
-    <p:handoutMasterId r:id="rId43"/>
+    <p:handoutMasterId r:id="rId44"/>
   </p:handoutMasterIdLst>
   <p:sldIdLst>
     <p:sldId id="503" r:id="rId2"/>
@@ -36,21 +36,22 @@
     <p:sldId id="778" r:id="rId24"/>
     <p:sldId id="787" r:id="rId25"/>
     <p:sldId id="789" r:id="rId26"/>
-    <p:sldId id="780" r:id="rId27"/>
-    <p:sldId id="589" r:id="rId28"/>
-    <p:sldId id="590" r:id="rId29"/>
-    <p:sldId id="791" r:id="rId30"/>
-    <p:sldId id="608" r:id="rId31"/>
-    <p:sldId id="653" r:id="rId32"/>
-    <p:sldId id="788" r:id="rId33"/>
-    <p:sldId id="654" r:id="rId34"/>
-    <p:sldId id="797" r:id="rId35"/>
-    <p:sldId id="799" r:id="rId36"/>
-    <p:sldId id="800" r:id="rId37"/>
-    <p:sldId id="798" r:id="rId38"/>
-    <p:sldId id="633" r:id="rId39"/>
-    <p:sldId id="504" r:id="rId40"/>
-    <p:sldId id="505" r:id="rId41"/>
+    <p:sldId id="801" r:id="rId27"/>
+    <p:sldId id="780" r:id="rId28"/>
+    <p:sldId id="589" r:id="rId29"/>
+    <p:sldId id="590" r:id="rId30"/>
+    <p:sldId id="791" r:id="rId31"/>
+    <p:sldId id="608" r:id="rId32"/>
+    <p:sldId id="653" r:id="rId33"/>
+    <p:sldId id="788" r:id="rId34"/>
+    <p:sldId id="654" r:id="rId35"/>
+    <p:sldId id="797" r:id="rId36"/>
+    <p:sldId id="799" r:id="rId37"/>
+    <p:sldId id="800" r:id="rId38"/>
+    <p:sldId id="798" r:id="rId39"/>
+    <p:sldId id="633" r:id="rId40"/>
+    <p:sldId id="504" r:id="rId41"/>
+    <p:sldId id="505" r:id="rId42"/>
   </p:sldIdLst>
   <p:sldSz cx="12192000" cy="6858000"/>
   <p:notesSz cx="6858000" cy="9144000"/>
@@ -191,6 +192,7 @@
             <p14:sldId id="778"/>
             <p14:sldId id="787"/>
             <p14:sldId id="789"/>
+            <p14:sldId id="801"/>
             <p14:sldId id="780"/>
           </p14:sldIdLst>
         </p14:section>
@@ -243,6 +245,12 @@
 </p:presentation>
 </file>
 
+<file path=ppt/authors.xml><?xml version="1.0" encoding="utf-8"?>
+<p188:authorLst xmlns:a="http://schemas.openxmlformats.org/drawingml/2006/main" xmlns:r="http://schemas.openxmlformats.org/officeDocument/2006/relationships" xmlns:p188="http://schemas.microsoft.com/office/powerpoint/2018/8/main">
+  <p188:author id="{CB4BF2F8-D32F-9387-A6CE-368ED6EFDCF0}" name="Zaraliev" initials="KZ" userId="S::Zaraliev@students.softuni.bg::e1c6524a-140e-4108-9ad5-216363431969" providerId="AD"/>
+</p188:authorLst>
+</file>
+
 <file path=ppt/commentAuthors.xml><?xml version="1.0" encoding="utf-8"?>
 <p:cmAuthorLst xmlns:a="http://schemas.openxmlformats.org/drawingml/2006/main" xmlns:r="http://schemas.openxmlformats.org/officeDocument/2006/relationships" xmlns:p="http://schemas.openxmlformats.org/presentationml/2006/main">
   <p:cmAuthor id="1" name="PC" initials="P" lastIdx="8" clrIdx="0">
@@ -260,6 +268,196 @@
     </p:extLst>
   </p:cmAuthor>
 </p:cmAuthorLst>
+</file>
+
+<file path=ppt/comments/modernComment_161_34953828.xml><?xml version="1.0" encoding="utf-8"?>
+<p188:cmLst xmlns:a="http://schemas.openxmlformats.org/drawingml/2006/main" xmlns:r="http://schemas.openxmlformats.org/officeDocument/2006/relationships" xmlns:p188="http://schemas.microsoft.com/office/powerpoint/2018/8/main">
+  <p188:cm id="{B17227C6-D9EF-4AE7-9A2D-7775F9DEB7BA}" authorId="{CB4BF2F8-D32F-9387-A6CE-368ED6EFDCF0}" created="2025-11-07T11:19:25.583">
+    <ac:deMkLst xmlns:ac="http://schemas.microsoft.com/office/drawing/2013/main/command">
+      <pc:docMk xmlns:pc="http://schemas.microsoft.com/office/powerpoint/2013/main/command"/>
+      <pc:sldMk xmlns:pc="http://schemas.microsoft.com/office/powerpoint/2013/main/command" cId="882194472" sldId="353"/>
+      <ac:spMk id="4" creationId="{BEB5BB41-09D4-4E9F-8C80-EE8709171CB3}"/>
+    </ac:deMkLst>
+    <p188:txBody>
+      <a:bodyPr/>
+      <a:lstStyle/>
+      <a:p>
+        <a:r>
+          <a:rPr lang="en-GB"/>
+          <a:t>Съкрати подзаглавието</a:t>
+        </a:r>
+      </a:p>
+    </p188:txBody>
+  </p188:cm>
+</p188:cmLst>
+</file>
+
+<file path=ppt/comments/modernComment_24B_72B0E9BD.xml><?xml version="1.0" encoding="utf-8"?>
+<p188:cmLst xmlns:a="http://schemas.openxmlformats.org/drawingml/2006/main" xmlns:r="http://schemas.openxmlformats.org/officeDocument/2006/relationships" xmlns:p188="http://schemas.microsoft.com/office/powerpoint/2018/8/main">
+  <p188:cm id="{4006D499-E098-4468-8504-751E22DFC801}" authorId="{CB4BF2F8-D32F-9387-A6CE-368ED6EFDCF0}" created="2025-11-07T11:21:10.069">
+    <ac:txMkLst xmlns:ac="http://schemas.microsoft.com/office/drawing/2013/main/command">
+      <pc:docMk xmlns:pc="http://schemas.microsoft.com/office/powerpoint/2013/main/command"/>
+      <pc:sldMk xmlns:pc="http://schemas.microsoft.com/office/powerpoint/2013/main/command" cId="1924196797" sldId="587"/>
+      <ac:spMk id="3" creationId="{231FFBC2-1649-5CEB-A57B-2417DB0629BD}"/>
+      <ac:txMk cp="138" len="38">
+        <ac:context len="177" hash="2331569026"/>
+      </ac:txMk>
+    </ac:txMkLst>
+    <p188:pos x="6941918" y="3284435"/>
+    <p188:txBody>
+      <a:bodyPr/>
+      <a:lstStyle/>
+      <a:p>
+        <a:r>
+          <a:rPr lang="en-GB"/>
+          <a:t>Да се дадат примери с линкове</a:t>
+        </a:r>
+      </a:p>
+    </p188:txBody>
+  </p188:cm>
+</p188:cmLst>
+</file>
+
+<file path=ppt/comments/modernComment_260_894324A0.xml><?xml version="1.0" encoding="utf-8"?>
+<p188:cmLst xmlns:a="http://schemas.openxmlformats.org/drawingml/2006/main" xmlns:r="http://schemas.openxmlformats.org/officeDocument/2006/relationships" xmlns:p188="http://schemas.microsoft.com/office/powerpoint/2018/8/main">
+  <p188:cm id="{8C2D17A9-A76B-4DDA-B797-BFA5628056FA}" authorId="{CB4BF2F8-D32F-9387-A6CE-368ED6EFDCF0}" created="2025-11-07T11:47:28.275">
+    <ac:txMkLst xmlns:ac="http://schemas.microsoft.com/office/drawing/2013/main/command">
+      <pc:docMk xmlns:pc="http://schemas.microsoft.com/office/powerpoint/2013/main/command"/>
+      <pc:sldMk xmlns:pc="http://schemas.microsoft.com/office/powerpoint/2013/main/command" cId="2302878880" sldId="608"/>
+      <ac:spMk id="7" creationId="{320B2856-CE5E-4934-BD1C-1D81E68E529A}"/>
+      <ac:txMk cp="28" len="35">
+        <ac:context len="187" hash="1413822994"/>
+      </ac:txMk>
+    </ac:txMkLst>
+    <p188:pos x="8427818" y="964145"/>
+    <p188:txBody>
+      <a:bodyPr/>
+      <a:lstStyle/>
+      <a:p>
+        <a:r>
+          <a:rPr lang="en-GB"/>
+          <a:t>Провери терминът "превежда" дали е правилно използван тук</a:t>
+        </a:r>
+      </a:p>
+    </p188:txBody>
+  </p188:cm>
+</p188:cmLst>
+</file>
+
+<file path=ppt/comments/modernComment_28D_523D9B2B.xml><?xml version="1.0" encoding="utf-8"?>
+<p188:cmLst xmlns:a="http://schemas.openxmlformats.org/drawingml/2006/main" xmlns:r="http://schemas.openxmlformats.org/officeDocument/2006/relationships" xmlns:p188="http://schemas.microsoft.com/office/powerpoint/2018/8/main">
+  <p188:cm id="{6EA45C6C-FDA3-4D18-9480-1200FE14D50D}" authorId="{CB4BF2F8-D32F-9387-A6CE-368ED6EFDCF0}" created="2025-11-07T11:50:11.681">
+    <ac:deMkLst xmlns:ac="http://schemas.microsoft.com/office/drawing/2013/main/command">
+      <pc:docMk xmlns:pc="http://schemas.microsoft.com/office/powerpoint/2013/main/command"/>
+      <pc:sldMk xmlns:pc="http://schemas.microsoft.com/office/powerpoint/2013/main/command" cId="1379769131" sldId="653"/>
+      <ac:spMk id="2" creationId="{E1C9EBAF-5D74-E427-A3FA-2054C9D6D0CC}"/>
+    </ac:deMkLst>
+    <p188:txBody>
+      <a:bodyPr/>
+      <a:lstStyle/>
+      <a:p>
+        <a:r>
+          <a:rPr lang="en-GB"/>
+          <a:t>Да се даде изчистен пример за структурата на URL</a:t>
+        </a:r>
+      </a:p>
+    </p188:txBody>
+  </p188:cm>
+</p188:cmLst>
+</file>
+
+<file path=ppt/comments/modernComment_30E_3EE33F3.xml><?xml version="1.0" encoding="utf-8"?>
+<p188:cmLst xmlns:a="http://schemas.openxmlformats.org/drawingml/2006/main" xmlns:r="http://schemas.openxmlformats.org/officeDocument/2006/relationships" xmlns:p188="http://schemas.microsoft.com/office/powerpoint/2018/8/main">
+  <p188:cm id="{1B7C83A7-E462-435D-B870-F192C98B7119}" authorId="{CB4BF2F8-D32F-9387-A6CE-368ED6EFDCF0}" created="2025-11-07T11:21:34.003">
+    <ac:txMkLst xmlns:ac="http://schemas.microsoft.com/office/drawing/2013/main/command">
+      <pc:docMk xmlns:pc="http://schemas.microsoft.com/office/powerpoint/2013/main/command"/>
+      <pc:sldMk xmlns:pc="http://schemas.microsoft.com/office/powerpoint/2013/main/command" cId="65942515" sldId="782"/>
+      <ac:spMk id="3" creationId="{231FFBC2-1649-5CEB-A57B-2417DB0629BD}"/>
+      <ac:txMk cp="153" len="41">
+        <ac:context len="195" hash="3495552671"/>
+      </ac:txMk>
+    </ac:txMkLst>
+    <p188:pos x="6324698" y="4301705"/>
+    <p188:txBody>
+      <a:bodyPr/>
+      <a:lstStyle/>
+      <a:p>
+        <a:r>
+          <a:rPr lang="en-GB"/>
+          <a:t>Добавяне на примери с линкове</a:t>
+        </a:r>
+      </a:p>
+    </p188:txBody>
+  </p188:cm>
+</p188:cmLst>
+</file>
+
+<file path=ppt/comments/modernComment_30F_8941E98E.xml><?xml version="1.0" encoding="utf-8"?>
+<p188:cmLst xmlns:a="http://schemas.openxmlformats.org/drawingml/2006/main" xmlns:r="http://schemas.openxmlformats.org/officeDocument/2006/relationships" xmlns:p188="http://schemas.microsoft.com/office/powerpoint/2018/8/main">
+  <p188:cm id="{192CDEF9-E6B6-4DCF-B142-AC02069D59A3}" authorId="{CB4BF2F8-D32F-9387-A6CE-368ED6EFDCF0}" created="2025-11-07T11:23:52.210">
+    <ac:deMkLst xmlns:ac="http://schemas.microsoft.com/office/drawing/2013/main/command">
+      <pc:docMk xmlns:pc="http://schemas.microsoft.com/office/powerpoint/2013/main/command"/>
+      <pc:sldMk xmlns:pc="http://schemas.microsoft.com/office/powerpoint/2013/main/command" cId="2302798222" sldId="783"/>
+      <ac:spMk id="7" creationId="{FBFEFCDD-E454-D1E7-D67F-EE67BB2A7ACE}"/>
+    </ac:deMkLst>
+    <p188:txBody>
+      <a:bodyPr/>
+      <a:lstStyle/>
+      <a:p>
+        <a:r>
+          <a:rPr lang="en-GB"/>
+          <a:t>Добавяне на примери с линкове</a:t>
+        </a:r>
+      </a:p>
+    </p188:txBody>
+  </p188:cm>
+</p188:cmLst>
+</file>
+
+<file path=ppt/comments/modernComment_31F_9F960865.xml><?xml version="1.0" encoding="utf-8"?>
+<p188:cmLst xmlns:a="http://schemas.openxmlformats.org/drawingml/2006/main" xmlns:r="http://schemas.openxmlformats.org/officeDocument/2006/relationships" xmlns:p188="http://schemas.microsoft.com/office/powerpoint/2018/8/main">
+  <p188:cm id="{8C2B87EF-113C-4F7A-8A34-6DCBE9C76D47}" authorId="{CB4BF2F8-D32F-9387-A6CE-368ED6EFDCF0}" created="2025-11-07T11:54:20.823">
+    <ac:deMkLst xmlns:ac="http://schemas.microsoft.com/office/drawing/2013/main/command">
+      <pc:docMk xmlns:pc="http://schemas.microsoft.com/office/powerpoint/2013/main/command"/>
+      <pc:sldMk xmlns:pc="http://schemas.microsoft.com/office/powerpoint/2013/main/command" cId="2677409893" sldId="799"/>
+      <ac:graphicFrameMk id="7" creationId="{3557BAB7-1DD9-DD1C-75EF-CEE8D24AD214}"/>
+    </ac:deMkLst>
+    <p188:txBody>
+      <a:bodyPr/>
+      <a:lstStyle/>
+      <a:p>
+        <a:r>
+          <a:rPr lang="en-GB"/>
+          <a:t>Да се добавят text box-ове, за да могат да се показват текстовете с анимации</a:t>
+        </a:r>
+      </a:p>
+    </p188:txBody>
+  </p188:cm>
+  <p188:cm id="{322D9E98-F9A7-4DC2-9423-CEAE7BEA9DB8}" authorId="{CB4BF2F8-D32F-9387-A6CE-368ED6EFDCF0}" created="2025-11-07T11:56:53.526">
+    <ac:txMkLst xmlns:ac="http://schemas.microsoft.com/office/drawing/2013/main/command">
+      <pc:docMk xmlns:pc="http://schemas.microsoft.com/office/powerpoint/2013/main/command"/>
+      <pc:sldMk xmlns:pc="http://schemas.microsoft.com/office/powerpoint/2013/main/command" cId="2677409893" sldId="799"/>
+      <ac:graphicFrameMk id="7" creationId="{3557BAB7-1DD9-DD1C-75EF-CEE8D24AD214}"/>
+      <ac:tblMk/>
+      <ac:tcMk rowId="1210854640" colId="3700237570"/>
+      <ac:txMk cp="13" len="3">
+        <ac:context len="64" hash="1102481728"/>
+      </ac:txMk>
+    </ac:txMkLst>
+    <p188:pos x="3190380" y="3499560"/>
+    <p188:txBody>
+      <a:bodyPr/>
+      <a:lstStyle/>
+      <a:p>
+        <a:r>
+          <a:rPr lang="en-GB"/>
+          <a:t>Измисли по-добро описание на целта за сайта chatgpt
+</a:t>
+        </a:r>
+      </a:p>
+    </p188:txBody>
+  </p188:cm>
+</p188:cmLst>
 </file>
 
 <file path=ppt/handoutMasters/handoutMaster1.xml><?xml version="1.0" encoding="utf-8"?>
@@ -356,7 +554,7 @@
           <a:p>
             <a:fld id="{4E087215-0C8F-4762-A664-737A353EC9A4}" type="datetimeFigureOut">
               <a:rPr lang="bg-BG" smtClean="0"/>
-              <a:t>23.10.25 г.</a:t>
+              <a:t>7.11.2025 г.</a:t>
             </a:fld>
             <a:endParaRPr lang="bg-BG"/>
           </a:p>
@@ -552,7 +750,7 @@
           <a:p>
             <a:fld id="{72D84649-876A-46C9-8472-14CB09C070D8}" type="datetimeFigureOut">
               <a:rPr lang="en-US" smtClean="0"/>
-              <a:t>10/23/25</a:t>
+              <a:t>11/7/2025</a:t>
             </a:fld>
             <a:endParaRPr lang="en-US"/>
           </a:p>
@@ -2532,7 +2730,7 @@
             <a:fld id="{3EBA5BD7-F043-4D1B-AA17-CD412FC534DE}" type="slidenum">
               <a:rPr lang="en-US" smtClean="0"/>
               <a:pPr/>
-              <a:t>26</a:t>
+              <a:t>27</a:t>
             </a:fld>
             <a:endParaRPr lang="en-US" dirty="0"/>
           </a:p>
@@ -2762,7 +2960,7 @@
             <a:fld id="{3EBA5BD7-F043-4D1B-AA17-CD412FC534DE}" type="slidenum">
               <a:rPr lang="en-US" smtClean="0"/>
               <a:pPr/>
-              <a:t>27</a:t>
+              <a:t>28</a:t>
             </a:fld>
             <a:endParaRPr lang="en-US" dirty="0"/>
           </a:p>
@@ -2992,7 +3190,7 @@
             <a:fld id="{3EBA5BD7-F043-4D1B-AA17-CD412FC534DE}" type="slidenum">
               <a:rPr lang="en-US" smtClean="0"/>
               <a:pPr/>
-              <a:t>28</a:t>
+              <a:t>29</a:t>
             </a:fld>
             <a:endParaRPr lang="en-US" dirty="0"/>
           </a:p>
@@ -3222,7 +3420,7 @@
             <a:fld id="{3EBA5BD7-F043-4D1B-AA17-CD412FC534DE}" type="slidenum">
               <a:rPr lang="en-US" smtClean="0"/>
               <a:pPr/>
-              <a:t>29</a:t>
+              <a:t>30</a:t>
             </a:fld>
             <a:endParaRPr lang="en-US" dirty="0"/>
           </a:p>
@@ -3694,7 +3892,7 @@
             <a:fld id="{3EBA5BD7-F043-4D1B-AA17-CD412FC534DE}" type="slidenum">
               <a:rPr lang="en-US" smtClean="0"/>
               <a:pPr/>
-              <a:t>30</a:t>
+              <a:t>31</a:t>
             </a:fld>
             <a:endParaRPr lang="en-US" dirty="0"/>
           </a:p>
@@ -3924,7 +4122,7 @@
             <a:fld id="{3EBA5BD7-F043-4D1B-AA17-CD412FC534DE}" type="slidenum">
               <a:rPr lang="en-US" smtClean="0"/>
               <a:pPr/>
-              <a:t>31</a:t>
+              <a:t>32</a:t>
             </a:fld>
             <a:endParaRPr lang="en-US" dirty="0"/>
           </a:p>
@@ -4154,7 +4352,7 @@
             <a:fld id="{3EBA5BD7-F043-4D1B-AA17-CD412FC534DE}" type="slidenum">
               <a:rPr lang="en-US" smtClean="0"/>
               <a:pPr/>
-              <a:t>32</a:t>
+              <a:t>33</a:t>
             </a:fld>
             <a:endParaRPr lang="en-US" dirty="0"/>
           </a:p>
@@ -4384,7 +4582,7 @@
             <a:fld id="{3EBA5BD7-F043-4D1B-AA17-CD412FC534DE}" type="slidenum">
               <a:rPr lang="en-US" smtClean="0"/>
               <a:pPr/>
-              <a:t>33</a:t>
+              <a:t>34</a:t>
             </a:fld>
             <a:endParaRPr lang="en-US" dirty="0"/>
           </a:p>
@@ -4614,7 +4812,7 @@
             <a:fld id="{3EBA5BD7-F043-4D1B-AA17-CD412FC534DE}" type="slidenum">
               <a:rPr lang="en-US" smtClean="0"/>
               <a:pPr/>
-              <a:t>38</a:t>
+              <a:t>39</a:t>
             </a:fld>
             <a:endParaRPr lang="en-US" dirty="0"/>
           </a:p>
@@ -4860,7 +5058,7 @@
             <a:fld id="{3EBA5BD7-F043-4D1B-AA17-CD412FC534DE}" type="slidenum">
               <a:rPr lang="en-US" smtClean="0"/>
               <a:pPr/>
-              <a:t>39</a:t>
+              <a:t>40</a:t>
             </a:fld>
             <a:endParaRPr lang="en-US" dirty="0"/>
           </a:p>
@@ -5090,7 +5288,7 @@
             <a:fld id="{3EBA5BD7-F043-4D1B-AA17-CD412FC534DE}" type="slidenum">
               <a:rPr lang="en-US" smtClean="0"/>
               <a:pPr/>
-              <a:t>40</a:t>
+              <a:t>41</a:t>
             </a:fld>
             <a:endParaRPr lang="en-US" dirty="0"/>
           </a:p>
@@ -15606,7 +15804,23 @@
                   <a:schemeClr val="bg1"/>
                 </a:solidFill>
               </a:rPr>
-              <a:t>Страници с продукти и услуги</a:t>
+              <a:t>Страници с продукти и</a:t>
+            </a:r>
+            <a:r>
+              <a:rPr lang="en-GB" sz="3200" b="1" dirty="0">
+                <a:solidFill>
+                  <a:schemeClr val="bg1"/>
+                </a:solidFill>
+              </a:rPr>
+              <a:t>/</a:t>
+            </a:r>
+            <a:r>
+              <a:rPr lang="bg-BG" sz="3200" b="1" dirty="0">
+                <a:solidFill>
+                  <a:schemeClr val="bg1"/>
+                </a:solidFill>
+              </a:rPr>
+              <a:t>или услуги</a:t>
             </a:r>
           </a:p>
           <a:p>
@@ -22728,6 +22942,188 @@
       </p:grpSpPr>
       <p:sp>
         <p:nvSpPr>
+          <p:cNvPr id="2" name="Slide Number Placeholder 1">
+            <a:extLst>
+              <a:ext uri="{FF2B5EF4-FFF2-40B4-BE49-F238E27FC236}">
+                <a16:creationId xmlns:a16="http://schemas.microsoft.com/office/drawing/2014/main" id="{F702C971-7FD4-9A24-DEA3-AEE55894B956}"/>
+              </a:ext>
+            </a:extLst>
+          </p:cNvPr>
+          <p:cNvSpPr>
+            <a:spLocks noGrp="1"/>
+          </p:cNvSpPr>
+          <p:nvPr>
+            <p:ph type="sldNum" sz="quarter" idx="5"/>
+          </p:nvPr>
+        </p:nvSpPr>
+        <p:spPr/>
+        <p:txBody>
+          <a:bodyPr/>
+          <a:lstStyle/>
+          <a:p>
+            <a:fld id="{2BF067CD-8E6B-4360-9AA8-C5DF2A48A6D1}" type="slidenum">
+              <a:rPr lang="en-US" noProof="0" smtClean="0"/>
+              <a:pPr/>
+              <a:t>26</a:t>
+            </a:fld>
+            <a:endParaRPr lang="en-US" noProof="0" dirty="0"/>
+          </a:p>
+        </p:txBody>
+      </p:sp>
+      <p:sp>
+        <p:nvSpPr>
+          <p:cNvPr id="3" name="Text Placeholder 2">
+            <a:extLst>
+              <a:ext uri="{FF2B5EF4-FFF2-40B4-BE49-F238E27FC236}">
+                <a16:creationId xmlns:a16="http://schemas.microsoft.com/office/drawing/2014/main" id="{33309270-EB17-EB18-F05B-08C9016422A6}"/>
+              </a:ext>
+            </a:extLst>
+          </p:cNvPr>
+          <p:cNvSpPr>
+            <a:spLocks noGrp="1"/>
+          </p:cNvSpPr>
+          <p:nvPr>
+            <p:ph type="body" sz="quarter" idx="10"/>
+          </p:nvPr>
+        </p:nvSpPr>
+        <p:spPr/>
+        <p:txBody>
+          <a:bodyPr>
+            <a:normAutofit/>
+          </a:bodyPr>
+          <a:lstStyle/>
+          <a:p>
+            <a:r>
+              <a:rPr lang="bg-BG" sz="5400" dirty="0">
+                <a:highlight>
+                  <a:srgbClr val="FFFF00"/>
+                </a:highlight>
+              </a:rPr>
+              <a:t>Добави снимка на контролен панел например:</a:t>
+            </a:r>
+          </a:p>
+          <a:p>
+            <a:pPr lvl="1"/>
+            <a:r>
+              <a:rPr lang="en-GB" sz="4800" dirty="0" err="1">
+                <a:highlight>
+                  <a:srgbClr val="FFFF00"/>
+                </a:highlight>
+              </a:rPr>
+              <a:t>Cpanel</a:t>
+            </a:r>
+            <a:r>
+              <a:rPr lang="en-GB" sz="4800" dirty="0">
+                <a:highlight>
+                  <a:srgbClr val="FFFF00"/>
+                </a:highlight>
+              </a:rPr>
+              <a:t>, </a:t>
+            </a:r>
+            <a:r>
+              <a:rPr lang="en-GB" sz="4800" dirty="0" err="1">
+                <a:highlight>
+                  <a:srgbClr val="FFFF00"/>
+                </a:highlight>
+              </a:rPr>
+              <a:t>Vercel</a:t>
+            </a:r>
+            <a:r>
+              <a:rPr lang="en-GB" sz="4800" dirty="0">
+                <a:highlight>
+                  <a:srgbClr val="FFFF00"/>
+                </a:highlight>
+              </a:rPr>
+              <a:t>, </a:t>
+            </a:r>
+            <a:r>
+              <a:rPr lang="en-GB" sz="4800" dirty="0" err="1">
+                <a:highlight>
+                  <a:srgbClr val="FFFF00"/>
+                </a:highlight>
+              </a:rPr>
+              <a:t>Hostinger</a:t>
+            </a:r>
+            <a:r>
+              <a:rPr lang="en-GB" sz="4800" dirty="0">
+                <a:highlight>
+                  <a:srgbClr val="FFFF00"/>
+                </a:highlight>
+              </a:rPr>
+              <a:t>…</a:t>
+            </a:r>
+          </a:p>
+        </p:txBody>
+      </p:sp>
+      <p:sp>
+        <p:nvSpPr>
+          <p:cNvPr id="4" name="Title 3">
+            <a:extLst>
+              <a:ext uri="{FF2B5EF4-FFF2-40B4-BE49-F238E27FC236}">
+                <a16:creationId xmlns:a16="http://schemas.microsoft.com/office/drawing/2014/main" id="{B71B438B-7CF3-6FB0-8177-884335307167}"/>
+              </a:ext>
+            </a:extLst>
+          </p:cNvPr>
+          <p:cNvSpPr>
+            <a:spLocks noGrp="1"/>
+          </p:cNvSpPr>
+          <p:nvPr>
+            <p:ph type="title"/>
+          </p:nvPr>
+        </p:nvSpPr>
+        <p:spPr/>
+        <p:txBody>
+          <a:bodyPr/>
+          <a:lstStyle/>
+          <a:p>
+            <a:r>
+              <a:rPr lang="bg-BG" dirty="0"/>
+              <a:t>Контролен панел</a:t>
+            </a:r>
+            <a:endParaRPr lang="en-GB" dirty="0"/>
+          </a:p>
+        </p:txBody>
+      </p:sp>
+    </p:spTree>
+    <p:extLst>
+      <p:ext uri="{BB962C8B-B14F-4D97-AF65-F5344CB8AC3E}">
+        <p14:creationId xmlns:p14="http://schemas.microsoft.com/office/powerpoint/2010/main" val="1889772226"/>
+      </p:ext>
+    </p:extLst>
+  </p:cSld>
+  <p:clrMapOvr>
+    <a:masterClrMapping/>
+  </p:clrMapOvr>
+  <mc:AlternateContent xmlns:mc="http://schemas.openxmlformats.org/markup-compatibility/2006" xmlns:p14="http://schemas.microsoft.com/office/powerpoint/2010/main">
+    <mc:Choice Requires="p14">
+      <p:transition spd="slow" p14:dur="2000" advClick="0" advTm="5000"/>
+    </mc:Choice>
+    <mc:Fallback xmlns="">
+      <p:transition spd="slow" advClick="0" advTm="5000"/>
+    </mc:Fallback>
+  </mc:AlternateContent>
+</p:sld>
+</file>
+
+<file path=ppt/slides/slide27.xml><?xml version="1.0" encoding="utf-8"?>
+<p:sld xmlns:a="http://schemas.openxmlformats.org/drawingml/2006/main" xmlns:r="http://schemas.openxmlformats.org/officeDocument/2006/relationships" xmlns:p="http://schemas.openxmlformats.org/presentationml/2006/main">
+  <p:cSld>
+    <p:spTree>
+      <p:nvGrpSpPr>
+        <p:cNvPr id="1" name=""/>
+        <p:cNvGrpSpPr/>
+        <p:nvPr/>
+      </p:nvGrpSpPr>
+      <p:grpSpPr>
+        <a:xfrm>
+          <a:off x="0" y="0"/>
+          <a:ext cx="0" cy="0"/>
+          <a:chOff x="0" y="0"/>
+          <a:chExt cx="0" cy="0"/>
+        </a:xfrm>
+      </p:grpSpPr>
+      <p:sp>
+        <p:nvSpPr>
           <p:cNvPr id="9" name="Slide Number">
             <a:extLst>
               <a:ext uri="{FF2B5EF4-FFF2-40B4-BE49-F238E27FC236}">
@@ -22754,7 +23150,7 @@
             <a:fld id="{2BF067CD-8E6B-4360-9AA8-C5DF2A48A6D1}" type="slidenum">
               <a:rPr lang="en-US" smtClean="0"/>
               <a:pPr/>
-              <a:t>26</a:t>
+              <a:t>27</a:t>
             </a:fld>
             <a:endParaRPr lang="en-US" dirty="0"/>
           </a:p>
@@ -22889,6 +23285,14 @@
             <a:r>
               <a:rPr lang="bg-BG" sz="3600" b="1" dirty="0"/>
               <a:t>потребителят въвежда</a:t>
+            </a:r>
+            <a:r>
+              <a:rPr lang="en-GB" sz="3600" b="1" dirty="0"/>
+              <a:t> </a:t>
+            </a:r>
+            <a:r>
+              <a:rPr lang="bg-BG" sz="3600" dirty="0"/>
+              <a:t>в търсачката</a:t>
             </a:r>
             <a:endParaRPr lang="bg-BG" sz="3200" b="1" dirty="0"/>
           </a:p>
@@ -23193,7 +23597,7 @@
 </p:sld>
 </file>
 
-<file path=ppt/slides/slide27.xml><?xml version="1.0" encoding="utf-8"?>
+<file path=ppt/slides/slide28.xml><?xml version="1.0" encoding="utf-8"?>
 <p:sld xmlns:a="http://schemas.openxmlformats.org/drawingml/2006/main" xmlns:r="http://schemas.openxmlformats.org/officeDocument/2006/relationships" xmlns:p="http://schemas.openxmlformats.org/presentationml/2006/main">
   <p:cSld>
     <p:spTree>
@@ -23335,7 +23739,7 @@
 </p:sld>
 </file>
 
-<file path=ppt/slides/slide28.xml><?xml version="1.0" encoding="utf-8"?>
+<file path=ppt/slides/slide29.xml><?xml version="1.0" encoding="utf-8"?>
 <p:sld xmlns:a="http://schemas.openxmlformats.org/drawingml/2006/main" xmlns:r="http://schemas.openxmlformats.org/officeDocument/2006/relationships" xmlns:p="http://schemas.openxmlformats.org/presentationml/2006/main">
   <p:cSld>
     <p:spTree>
@@ -23385,7 +23789,7 @@
             <a:fld id="{2BF067CD-8E6B-4360-9AA8-C5DF2A48A6D1}" type="slidenum">
               <a:rPr lang="en-US" smtClean="0"/>
               <a:pPr/>
-              <a:t>28</a:t>
+              <a:t>29</a:t>
             </a:fld>
             <a:endParaRPr lang="en-US" dirty="0"/>
           </a:p>
@@ -23579,9 +23983,14 @@
               <a:rPr lang="en-US" sz="3200" b="1" noProof="1">
                 <a:latin typeface="Consolas" pitchFamily="49" charset="0"/>
                 <a:cs typeface="Consolas" pitchFamily="49" charset="0"/>
+                <a:hlinkClick r:id="rId3"/>
               </a:rPr>
               <a:t>www.google.com</a:t>
             </a:r>
+            <a:endParaRPr lang="en-US" sz="3200" b="1" noProof="1">
+              <a:latin typeface="Consolas" pitchFamily="49" charset="0"/>
+              <a:cs typeface="Consolas" pitchFamily="49" charset="0"/>
+            </a:endParaRPr>
           </a:p>
         </p:txBody>
       </p:sp>
@@ -23647,6 +24056,7 @@
               <a:rPr lang="en-BG" sz="3200" b="1" dirty="0">
                 <a:latin typeface="Consolas" panose="020B0609020204030204" pitchFamily="49" charset="0"/>
                 <a:cs typeface="Consolas" panose="020B0609020204030204" pitchFamily="49" charset="0"/>
+                <a:hlinkClick r:id="rId4"/>
               </a:rPr>
               <a:t>142.250.186.78</a:t>
             </a:r>
@@ -24000,7 +24410,143 @@
 </p:sld>
 </file>
 
-<file path=ppt/slides/slide29.xml><?xml version="1.0" encoding="utf-8"?>
+<file path=ppt/slides/slide3.xml><?xml version="1.0" encoding="utf-8"?>
+<p:sld xmlns:a="http://schemas.openxmlformats.org/drawingml/2006/main" xmlns:r="http://schemas.openxmlformats.org/officeDocument/2006/relationships" xmlns:p="http://schemas.openxmlformats.org/presentationml/2006/main">
+  <p:cSld>
+    <p:spTree>
+      <p:nvGrpSpPr>
+        <p:cNvPr id="1" name=""/>
+        <p:cNvGrpSpPr/>
+        <p:nvPr/>
+      </p:nvGrpSpPr>
+      <p:grpSpPr>
+        <a:xfrm>
+          <a:off x="0" y="0"/>
+          <a:ext cx="0" cy="0"/>
+          <a:chOff x="0" y="0"/>
+          <a:chExt cx="0" cy="0"/>
+        </a:xfrm>
+      </p:grpSpPr>
+      <p:sp>
+        <p:nvSpPr>
+          <p:cNvPr id="4" name="Slide Subtitle">
+            <a:extLst>
+              <a:ext uri="{FF2B5EF4-FFF2-40B4-BE49-F238E27FC236}">
+                <a16:creationId xmlns:a16="http://schemas.microsoft.com/office/drawing/2014/main" id="{BEB5BB41-09D4-4E9F-8C80-EE8709171CB3}"/>
+              </a:ext>
+            </a:extLst>
+          </p:cNvPr>
+          <p:cNvSpPr>
+            <a:spLocks noGrp="1"/>
+          </p:cNvSpPr>
+          <p:nvPr>
+            <p:ph type="subTitle" sz="quarter" idx="11"/>
+          </p:nvPr>
+        </p:nvSpPr>
+        <p:spPr/>
+        <p:txBody>
+          <a:bodyPr/>
+          <a:lstStyle/>
+          <a:p>
+            <a:r>
+              <a:rPr lang="bg-BG" sz="3600" dirty="0"/>
+              <a:t>Въведение, видове, етапи, роли, цел и целеви групи</a:t>
+            </a:r>
+          </a:p>
+        </p:txBody>
+      </p:sp>
+      <p:sp>
+        <p:nvSpPr>
+          <p:cNvPr id="6" name="Slide Title">
+            <a:extLst>
+              <a:ext uri="{FF2B5EF4-FFF2-40B4-BE49-F238E27FC236}">
+                <a16:creationId xmlns:a16="http://schemas.microsoft.com/office/drawing/2014/main" id="{028D9EA3-B5E0-4F17-9467-4BE3C280DA68}"/>
+              </a:ext>
+            </a:extLst>
+          </p:cNvPr>
+          <p:cNvSpPr>
+            <a:spLocks noGrp="1"/>
+          </p:cNvSpPr>
+          <p:nvPr>
+            <p:ph type="title" sz="quarter" idx="10"/>
+          </p:nvPr>
+        </p:nvSpPr>
+        <p:spPr/>
+        <p:txBody>
+          <a:bodyPr/>
+          <a:lstStyle/>
+          <a:p>
+            <a:r>
+              <a:rPr lang="bg-BG" sz="6000" dirty="0"/>
+              <a:t>Уеб сайтове</a:t>
+            </a:r>
+            <a:endParaRPr lang="en-US" sz="6000" dirty="0"/>
+          </a:p>
+        </p:txBody>
+      </p:sp>
+      <p:pic>
+        <p:nvPicPr>
+          <p:cNvPr id="3" name="Picture 2">
+            <a:extLst>
+              <a:ext uri="{FF2B5EF4-FFF2-40B4-BE49-F238E27FC236}">
+                <a16:creationId xmlns:a16="http://schemas.microsoft.com/office/drawing/2014/main" id="{F94569CA-B2E8-B36B-E372-D9B43AC52735}"/>
+              </a:ext>
+            </a:extLst>
+          </p:cNvPr>
+          <p:cNvPicPr>
+            <a:picLocks noChangeAspect="1"/>
+          </p:cNvPicPr>
+          <p:nvPr/>
+        </p:nvPicPr>
+        <p:blipFill>
+          <a:blip r:embed="rId4">
+            <a:extLst>
+              <a:ext uri="{28A0092B-C50C-407E-A947-70E740481C1C}">
+                <a14:useLocalDpi xmlns:a14="http://schemas.microsoft.com/office/drawing/2010/main" val="0"/>
+              </a:ext>
+            </a:extLst>
+          </a:blip>
+          <a:stretch>
+            <a:fillRect/>
+          </a:stretch>
+        </p:blipFill>
+        <p:spPr>
+          <a:xfrm>
+            <a:off x="4743513" y="1584000"/>
+            <a:ext cx="2704973" cy="2295000"/>
+          </a:xfrm>
+          <a:prstGeom prst="rect">
+            <a:avLst/>
+          </a:prstGeom>
+        </p:spPr>
+      </p:pic>
+    </p:spTree>
+    <p:extLst>
+      <p:ext uri="{BB962C8B-B14F-4D97-AF65-F5344CB8AC3E}">
+        <p14:creationId xmlns:p14="http://schemas.microsoft.com/office/powerpoint/2010/main" val="882194472"/>
+      </p:ext>
+    </p:extLst>
+  </p:cSld>
+  <p:clrMapOvr>
+    <a:masterClrMapping/>
+  </p:clrMapOvr>
+  <mc:AlternateContent xmlns:mc="http://schemas.openxmlformats.org/markup-compatibility/2006" xmlns:p14="http://schemas.microsoft.com/office/powerpoint/2010/main">
+    <mc:Choice Requires="p14">
+      <p:transition spd="slow" p14:dur="2000" advClick="0" advTm="5000"/>
+    </mc:Choice>
+    <mc:Fallback xmlns="">
+      <p:transition spd="slow" advClick="0" advTm="5000"/>
+    </mc:Fallback>
+  </mc:AlternateContent>
+  <p:extLst>
+    <p:ext uri="{6950BFC3-D8DA-4A85-94F7-54DA5524770B}">
+      <p188:commentRel xmlns:p188="http://schemas.microsoft.com/office/powerpoint/2018/8/main" r:id="rId3"/>
+    </p:ext>
+  </p:extLst>
+</p:sld>
+</file>
+
+<file path=ppt/slides/slide30.xml><?xml version="1.0" encoding="utf-8"?>
 <p:sld xmlns:a="http://schemas.openxmlformats.org/drawingml/2006/main" xmlns:r="http://schemas.openxmlformats.org/officeDocument/2006/relationships" xmlns:p="http://schemas.openxmlformats.org/presentationml/2006/main">
   <p:cSld>
     <p:spTree>
@@ -24050,7 +24596,7 @@
             <a:fld id="{2BF067CD-8E6B-4360-9AA8-C5DF2A48A6D1}" type="slidenum">
               <a:rPr lang="en-US" smtClean="0"/>
               <a:pPr/>
-              <a:t>29</a:t>
+              <a:t>30</a:t>
             </a:fld>
             <a:endParaRPr lang="en-US" dirty="0"/>
           </a:p>
@@ -24710,138 +25256,7 @@
 </p:sld>
 </file>
 
-<file path=ppt/slides/slide3.xml><?xml version="1.0" encoding="utf-8"?>
-<p:sld xmlns:a="http://schemas.openxmlformats.org/drawingml/2006/main" xmlns:r="http://schemas.openxmlformats.org/officeDocument/2006/relationships" xmlns:p="http://schemas.openxmlformats.org/presentationml/2006/main">
-  <p:cSld>
-    <p:spTree>
-      <p:nvGrpSpPr>
-        <p:cNvPr id="1" name=""/>
-        <p:cNvGrpSpPr/>
-        <p:nvPr/>
-      </p:nvGrpSpPr>
-      <p:grpSpPr>
-        <a:xfrm>
-          <a:off x="0" y="0"/>
-          <a:ext cx="0" cy="0"/>
-          <a:chOff x="0" y="0"/>
-          <a:chExt cx="0" cy="0"/>
-        </a:xfrm>
-      </p:grpSpPr>
-      <p:sp>
-        <p:nvSpPr>
-          <p:cNvPr id="4" name="Slide Subtitle">
-            <a:extLst>
-              <a:ext uri="{FF2B5EF4-FFF2-40B4-BE49-F238E27FC236}">
-                <a16:creationId xmlns:a16="http://schemas.microsoft.com/office/drawing/2014/main" id="{BEB5BB41-09D4-4E9F-8C80-EE8709171CB3}"/>
-              </a:ext>
-            </a:extLst>
-          </p:cNvPr>
-          <p:cNvSpPr>
-            <a:spLocks noGrp="1"/>
-          </p:cNvSpPr>
-          <p:nvPr>
-            <p:ph type="subTitle" sz="quarter" idx="11"/>
-          </p:nvPr>
-        </p:nvSpPr>
-        <p:spPr/>
-        <p:txBody>
-          <a:bodyPr/>
-          <a:lstStyle/>
-          <a:p>
-            <a:r>
-              <a:rPr lang="bg-BG" sz="3600" dirty="0"/>
-              <a:t>Въведение, видове, етапи, роли, цел и целеви групи</a:t>
-            </a:r>
-          </a:p>
-        </p:txBody>
-      </p:sp>
-      <p:sp>
-        <p:nvSpPr>
-          <p:cNvPr id="6" name="Slide Title">
-            <a:extLst>
-              <a:ext uri="{FF2B5EF4-FFF2-40B4-BE49-F238E27FC236}">
-                <a16:creationId xmlns:a16="http://schemas.microsoft.com/office/drawing/2014/main" id="{028D9EA3-B5E0-4F17-9467-4BE3C280DA68}"/>
-              </a:ext>
-            </a:extLst>
-          </p:cNvPr>
-          <p:cNvSpPr>
-            <a:spLocks noGrp="1"/>
-          </p:cNvSpPr>
-          <p:nvPr>
-            <p:ph type="title" sz="quarter" idx="10"/>
-          </p:nvPr>
-        </p:nvSpPr>
-        <p:spPr/>
-        <p:txBody>
-          <a:bodyPr/>
-          <a:lstStyle/>
-          <a:p>
-            <a:r>
-              <a:rPr lang="bg-BG" sz="6000" dirty="0"/>
-              <a:t>Уеб сайтове</a:t>
-            </a:r>
-            <a:endParaRPr lang="en-US" sz="6000" dirty="0"/>
-          </a:p>
-        </p:txBody>
-      </p:sp>
-      <p:pic>
-        <p:nvPicPr>
-          <p:cNvPr id="3" name="Picture 2">
-            <a:extLst>
-              <a:ext uri="{FF2B5EF4-FFF2-40B4-BE49-F238E27FC236}">
-                <a16:creationId xmlns:a16="http://schemas.microsoft.com/office/drawing/2014/main" id="{F94569CA-B2E8-B36B-E372-D9B43AC52735}"/>
-              </a:ext>
-            </a:extLst>
-          </p:cNvPr>
-          <p:cNvPicPr>
-            <a:picLocks noChangeAspect="1"/>
-          </p:cNvPicPr>
-          <p:nvPr/>
-        </p:nvPicPr>
-        <p:blipFill>
-          <a:blip r:embed="rId3">
-            <a:extLst>
-              <a:ext uri="{28A0092B-C50C-407E-A947-70E740481C1C}">
-                <a14:useLocalDpi xmlns:a14="http://schemas.microsoft.com/office/drawing/2010/main" val="0"/>
-              </a:ext>
-            </a:extLst>
-          </a:blip>
-          <a:stretch>
-            <a:fillRect/>
-          </a:stretch>
-        </p:blipFill>
-        <p:spPr>
-          <a:xfrm>
-            <a:off x="4743513" y="1584000"/>
-            <a:ext cx="2704973" cy="2295000"/>
-          </a:xfrm>
-          <a:prstGeom prst="rect">
-            <a:avLst/>
-          </a:prstGeom>
-        </p:spPr>
-      </p:pic>
-    </p:spTree>
-    <p:extLst>
-      <p:ext uri="{BB962C8B-B14F-4D97-AF65-F5344CB8AC3E}">
-        <p14:creationId xmlns:p14="http://schemas.microsoft.com/office/powerpoint/2010/main" val="882194472"/>
-      </p:ext>
-    </p:extLst>
-  </p:cSld>
-  <p:clrMapOvr>
-    <a:masterClrMapping/>
-  </p:clrMapOvr>
-  <mc:AlternateContent xmlns:mc="http://schemas.openxmlformats.org/markup-compatibility/2006" xmlns:p14="http://schemas.microsoft.com/office/powerpoint/2010/main">
-    <mc:Choice Requires="p14">
-      <p:transition spd="slow" p14:dur="2000" advClick="0" advTm="5000"/>
-    </mc:Choice>
-    <mc:Fallback xmlns="">
-      <p:transition spd="slow" advClick="0" advTm="5000"/>
-    </mc:Fallback>
-  </mc:AlternateContent>
-</p:sld>
-</file>
-
-<file path=ppt/slides/slide30.xml><?xml version="1.0" encoding="utf-8"?>
+<file path=ppt/slides/slide31.xml><?xml version="1.0" encoding="utf-8"?>
 <p:sld xmlns:a="http://schemas.openxmlformats.org/drawingml/2006/main" xmlns:r="http://schemas.openxmlformats.org/officeDocument/2006/relationships" xmlns:p="http://schemas.openxmlformats.org/presentationml/2006/main">
   <p:cSld>
     <p:spTree>
@@ -24891,7 +25306,7 @@
             <a:fld id="{2BF067CD-8E6B-4360-9AA8-C5DF2A48A6D1}" type="slidenum">
               <a:rPr lang="en-US" smtClean="0"/>
               <a:pPr/>
-              <a:t>30</a:t>
+              <a:t>31</a:t>
             </a:fld>
             <a:endParaRPr lang="en-US" dirty="0"/>
           </a:p>
@@ -25106,7 +25521,7 @@
           <p:nvPr/>
         </p:nvPicPr>
         <p:blipFill rotWithShape="1">
-          <a:blip r:embed="rId3">
+          <a:blip r:embed="rId4">
             <a:extLst>
               <a:ext uri="{28A0092B-C50C-407E-A947-70E740481C1C}">
                 <a14:useLocalDpi xmlns:a14="http://schemas.microsoft.com/office/drawing/2010/main" val="0"/>
@@ -25321,10 +25736,15 @@
       </p:par>
     </p:tnLst>
   </p:timing>
+  <p:extLst>
+    <p:ext uri="{6950BFC3-D8DA-4A85-94F7-54DA5524770B}">
+      <p188:commentRel xmlns:p188="http://schemas.microsoft.com/office/powerpoint/2018/8/main" r:id="rId3"/>
+    </p:ext>
+  </p:extLst>
 </p:sld>
 </file>
 
-<file path=ppt/slides/slide31.xml><?xml version="1.0" encoding="utf-8"?>
+<file path=ppt/slides/slide32.xml><?xml version="1.0" encoding="utf-8"?>
 <p:sld xmlns:a="http://schemas.openxmlformats.org/drawingml/2006/main" xmlns:r="http://schemas.openxmlformats.org/officeDocument/2006/relationships" xmlns:p="http://schemas.openxmlformats.org/presentationml/2006/main">
   <p:cSld>
     <p:spTree>
@@ -25374,7 +25794,7 @@
             <a:fld id="{2BF067CD-8E6B-4360-9AA8-C5DF2A48A6D1}" type="slidenum">
               <a:rPr lang="en-US" smtClean="0"/>
               <a:pPr/>
-              <a:t>31</a:t>
+              <a:t>32</a:t>
             </a:fld>
             <a:endParaRPr lang="en-US" dirty="0"/>
           </a:p>
@@ -25583,7 +26003,7 @@
                 <a:latin typeface="Consolas" pitchFamily="49" charset="0"/>
                 <a:cs typeface="Consolas" pitchFamily="49" charset="0"/>
               </a:rPr>
-              <a:t>https://www.google.com/search?q=web+design</a:t>
+              <a:t>https://www.test.com/about</a:t>
             </a:r>
           </a:p>
         </p:txBody>
@@ -25804,7 +26224,7 @@
         </p:nvSpPr>
         <p:spPr bwMode="auto">
           <a:xfrm>
-            <a:off x="7176000" y="5651999"/>
+            <a:off x="6501000" y="5640126"/>
             <a:ext cx="2430000" cy="649100"/>
           </a:xfrm>
           <a:prstGeom prst="wedgeRoundRectCallout">
@@ -26238,10 +26658,15 @@
       <p:bldP spid="6" grpId="0" animBg="1"/>
     </p:bldLst>
   </p:timing>
+  <p:extLst>
+    <p:ext uri="{6950BFC3-D8DA-4A85-94F7-54DA5524770B}">
+      <p188:commentRel xmlns:p188="http://schemas.microsoft.com/office/powerpoint/2018/8/main" r:id="rId3"/>
+    </p:ext>
+  </p:extLst>
 </p:sld>
 </file>
 
-<file path=ppt/slides/slide32.xml><?xml version="1.0" encoding="utf-8"?>
+<file path=ppt/slides/slide33.xml><?xml version="1.0" encoding="utf-8"?>
 <p:sld xmlns:a="http://schemas.openxmlformats.org/drawingml/2006/main" xmlns:r="http://schemas.openxmlformats.org/officeDocument/2006/relationships" xmlns:p="http://schemas.openxmlformats.org/presentationml/2006/main">
   <p:cSld>
     <p:spTree>
@@ -26291,7 +26716,7 @@
             <a:fld id="{2BF067CD-8E6B-4360-9AA8-C5DF2A48A6D1}" type="slidenum">
               <a:rPr lang="en-US" smtClean="0"/>
               <a:pPr/>
-              <a:t>32</a:t>
+              <a:t>33</a:t>
             </a:fld>
             <a:endParaRPr lang="en-US" dirty="0"/>
           </a:p>
@@ -26787,7 +27212,7 @@
 </p:sld>
 </file>
 
-<file path=ppt/slides/slide33.xml><?xml version="1.0" encoding="utf-8"?>
+<file path=ppt/slides/slide34.xml><?xml version="1.0" encoding="utf-8"?>
 <p:sld xmlns:a="http://schemas.openxmlformats.org/drawingml/2006/main" xmlns:r="http://schemas.openxmlformats.org/officeDocument/2006/relationships" xmlns:p="http://schemas.openxmlformats.org/presentationml/2006/main">
   <p:cSld>
     <p:spTree>
@@ -26918,7 +27343,7 @@
 </p:sld>
 </file>
 
-<file path=ppt/slides/slide34.xml><?xml version="1.0" encoding="utf-8"?>
+<file path=ppt/slides/slide35.xml><?xml version="1.0" encoding="utf-8"?>
 <p:sld xmlns:a="http://schemas.openxmlformats.org/drawingml/2006/main" xmlns:r="http://schemas.openxmlformats.org/officeDocument/2006/relationships" xmlns:p="http://schemas.openxmlformats.org/presentationml/2006/main">
   <p:cSld>
     <p:spTree>
@@ -26959,7 +27384,7 @@
             <a:fld id="{2BF067CD-8E6B-4360-9AA8-C5DF2A48A6D1}" type="slidenum">
               <a:rPr lang="en-US" noProof="0" smtClean="0"/>
               <a:pPr/>
-              <a:t>34</a:t>
+              <a:t>35</a:t>
             </a:fld>
             <a:endParaRPr lang="en-US" noProof="0" dirty="0"/>
           </a:p>
@@ -27393,7 +27818,7 @@
 </p:sld>
 </file>
 
-<file path=ppt/slides/slide35.xml><?xml version="1.0" encoding="utf-8"?>
+<file path=ppt/slides/slide36.xml><?xml version="1.0" encoding="utf-8"?>
 <p:sld xmlns:a="http://schemas.openxmlformats.org/drawingml/2006/main" xmlns:r="http://schemas.openxmlformats.org/officeDocument/2006/relationships" xmlns:p="http://schemas.openxmlformats.org/presentationml/2006/main">
   <p:cSld>
     <p:spTree>
@@ -27434,7 +27859,7 @@
             <a:fld id="{2BF067CD-8E6B-4360-9AA8-C5DF2A48A6D1}" type="slidenum">
               <a:rPr lang="en-US" noProof="0" smtClean="0"/>
               <a:pPr/>
-              <a:t>35</a:t>
+              <a:t>36</a:t>
             </a:fld>
             <a:endParaRPr lang="en-US" noProof="0" dirty="0"/>
           </a:p>
@@ -27535,7 +27960,7 @@
           <p:nvPr>
             <p:extLst>
               <p:ext uri="{D42A27DB-BD31-4B8C-83A1-F6EECF244321}">
-                <p14:modId xmlns:p14="http://schemas.microsoft.com/office/powerpoint/2010/main" val="1589693339"/>
+                <p14:modId xmlns:p14="http://schemas.microsoft.com/office/powerpoint/2010/main" val="3526426180"/>
               </p:ext>
             </p:extLst>
           </p:nvPr>
@@ -27776,7 +28201,7 @@
                       </a:pPr>
                       <a:r>
                         <a:rPr lang="en-US" sz="2000" dirty="0">
-                          <a:hlinkClick r:id="rId2"/>
+                          <a:hlinkClick r:id="rId3"/>
                         </a:rPr>
                         <a:t>mon.bg</a:t>
                       </a:r>
@@ -27855,9 +28280,15 @@
                         <a:rPr lang="bg-BG" sz="2000" b="1" dirty="0">
                           <a:effectLst/>
                         </a:rPr>
-                        <a:t>образованието</a:t>
+                        <a:t>образованието </a:t>
                       </a:r>
-                      <a:endParaRPr lang="en-BG" sz="2000" b="1" dirty="0">
+                      <a:r>
+                        <a:rPr lang="bg-BG" sz="2000" b="0" dirty="0">
+                          <a:effectLst/>
+                        </a:rPr>
+                        <a:t>в България</a:t>
+                      </a:r>
+                      <a:endParaRPr lang="en-BG" sz="2000" b="0" dirty="0">
                         <a:effectLst/>
                         <a:latin typeface="Calibri" panose="020F0502020204030204" pitchFamily="34" charset="0"/>
                         <a:ea typeface="Calibri" panose="020F0502020204030204" pitchFamily="34" charset="0"/>
@@ -27962,7 +28393,7 @@
                       </a:pPr>
                       <a:r>
                         <a:rPr lang="en-US" sz="2000" dirty="0">
-                          <a:hlinkClick r:id="rId3"/>
+                          <a:hlinkClick r:id="rId4"/>
                         </a:rPr>
                         <a:t>shkolo.bg</a:t>
                       </a:r>
@@ -28144,7 +28575,7 @@
                       </a:pPr>
                       <a:r>
                         <a:rPr lang="en-GB" sz="2000" dirty="0">
-                          <a:hlinkClick r:id="rId4"/>
+                          <a:hlinkClick r:id="rId5"/>
                         </a:rPr>
                         <a:t>google.com</a:t>
                       </a:r>
@@ -28326,7 +28757,7 @@
                       </a:pPr>
                       <a:r>
                         <a:rPr lang="en-US" sz="2000" dirty="0">
-                          <a:hlinkClick r:id="rId5"/>
+                          <a:hlinkClick r:id="rId6"/>
                         </a:rPr>
                         <a:t>chatgpt.com</a:t>
                       </a:r>
@@ -28359,7 +28790,7 @@
                         <a:rPr lang="bg-BG" sz="2000" b="0" dirty="0">
                           <a:effectLst/>
                         </a:rPr>
-                        <a:t>Предлага </a:t>
+                        <a:t>Платформа за ... </a:t>
                       </a:r>
                       <a:r>
                         <a:rPr lang="bg-BG" sz="2000" b="1" dirty="0">
@@ -28580,10 +29011,15 @@
       </p:par>
     </p:tnLst>
   </p:timing>
+  <p:extLst>
+    <p:ext uri="{6950BFC3-D8DA-4A85-94F7-54DA5524770B}">
+      <p188:commentRel xmlns:p188="http://schemas.microsoft.com/office/powerpoint/2018/8/main" r:id="rId2"/>
+    </p:ext>
+  </p:extLst>
 </p:sld>
 </file>
 
-<file path=ppt/slides/slide36.xml><?xml version="1.0" encoding="utf-8"?>
+<file path=ppt/slides/slide37.xml><?xml version="1.0" encoding="utf-8"?>
 <p:sld xmlns:a="http://schemas.openxmlformats.org/drawingml/2006/main" xmlns:r="http://schemas.openxmlformats.org/officeDocument/2006/relationships" xmlns:p="http://schemas.openxmlformats.org/presentationml/2006/main">
   <p:cSld>
     <p:spTree>
@@ -28624,7 +29060,7 @@
             <a:fld id="{2BF067CD-8E6B-4360-9AA8-C5DF2A48A6D1}" type="slidenum">
               <a:rPr lang="en-US" noProof="0" smtClean="0"/>
               <a:pPr/>
-              <a:t>36</a:t>
+              <a:t>37</a:t>
             </a:fld>
             <a:endParaRPr lang="en-US" noProof="0" dirty="0"/>
           </a:p>
@@ -28725,7 +29161,7 @@
           <p:nvPr>
             <p:extLst>
               <p:ext uri="{D42A27DB-BD31-4B8C-83A1-F6EECF244321}">
-                <p14:modId xmlns:p14="http://schemas.microsoft.com/office/powerpoint/2010/main" val="3271999712"/>
+                <p14:modId xmlns:p14="http://schemas.microsoft.com/office/powerpoint/2010/main" val="3007628158"/>
               </p:ext>
             </p:extLst>
           </p:nvPr>
@@ -29799,7 +30235,7 @@
 </p:sld>
 </file>
 
-<file path=ppt/slides/slide37.xml><?xml version="1.0" encoding="utf-8"?>
+<file path=ppt/slides/slide38.xml><?xml version="1.0" encoding="utf-8"?>
 <p:sld xmlns:a="http://schemas.openxmlformats.org/drawingml/2006/main" xmlns:r="http://schemas.openxmlformats.org/officeDocument/2006/relationships" xmlns:p="http://schemas.openxmlformats.org/presentationml/2006/main">
   <p:cSld>
     <p:spTree>
@@ -29840,7 +30276,7 @@
             <a:fld id="{2BF067CD-8E6B-4360-9AA8-C5DF2A48A6D1}" type="slidenum">
               <a:rPr lang="en-US" noProof="0" smtClean="0"/>
               <a:pPr/>
-              <a:t>37</a:t>
+              <a:t>38</a:t>
             </a:fld>
             <a:endParaRPr lang="en-US" noProof="0" dirty="0"/>
           </a:p>
@@ -31039,7 +31475,7 @@
 </p:sld>
 </file>
 
-<file path=ppt/slides/slide38.xml><?xml version="1.0" encoding="utf-8"?>
+<file path=ppt/slides/slide39.xml><?xml version="1.0" encoding="utf-8"?>
 <p:sld xmlns:a="http://schemas.openxmlformats.org/drawingml/2006/main" xmlns:r="http://schemas.openxmlformats.org/officeDocument/2006/relationships" xmlns:p="http://schemas.openxmlformats.org/presentationml/2006/main">
   <p:cSld>
     <p:spTree>
@@ -31955,7 +32391,7 @@
             <a:fld id="{2BF067CD-8E6B-4360-9AA8-C5DF2A48A6D1}" type="slidenum">
               <a:rPr lang="en-US" noProof="0" smtClean="0"/>
               <a:pPr/>
-              <a:t>38</a:t>
+              <a:t>39</a:t>
             </a:fld>
             <a:endParaRPr lang="en-US" noProof="0" dirty="0"/>
           </a:p>
@@ -32502,196 +32938,6 @@
 </p:sld>
 </file>
 
-<file path=ppt/slides/slide39.xml><?xml version="1.0" encoding="utf-8"?>
-<p:sld xmlns:a="http://schemas.openxmlformats.org/drawingml/2006/main" xmlns:r="http://schemas.openxmlformats.org/officeDocument/2006/relationships" xmlns:p="http://schemas.openxmlformats.org/presentationml/2006/main">
-  <p:cSld>
-    <p:spTree>
-      <p:nvGrpSpPr>
-        <p:cNvPr id="1" name=""/>
-        <p:cNvGrpSpPr/>
-        <p:nvPr/>
-      </p:nvGrpSpPr>
-      <p:grpSpPr>
-        <a:xfrm>
-          <a:off x="0" y="0"/>
-          <a:ext cx="0" cy="0"/>
-          <a:chOff x="0" y="0"/>
-          <a:chExt cx="0" cy="0"/>
-        </a:xfrm>
-      </p:grpSpPr>
-      <p:sp>
-        <p:nvSpPr>
-          <p:cNvPr id="5" name="Slide Title">
-            <a:extLst>
-              <a:ext uri="{FF2B5EF4-FFF2-40B4-BE49-F238E27FC236}">
-                <a16:creationId xmlns:a16="http://schemas.microsoft.com/office/drawing/2014/main" id="{FA0703FC-0F8F-4C80-A615-E4B381EC0E0C}"/>
-              </a:ext>
-            </a:extLst>
-          </p:cNvPr>
-          <p:cNvSpPr>
-            <a:spLocks noGrp="1"/>
-          </p:cNvSpPr>
-          <p:nvPr>
-            <p:ph type="title"/>
-          </p:nvPr>
-        </p:nvSpPr>
-        <p:spPr/>
-        <p:txBody>
-          <a:bodyPr/>
-          <a:lstStyle/>
-          <a:p>
-            <a:r>
-              <a:rPr lang="bg-BG" dirty="0"/>
-              <a:t>Въпроси</a:t>
-            </a:r>
-            <a:r>
-              <a:rPr lang="en-US" dirty="0"/>
-              <a:t>?</a:t>
-            </a:r>
-          </a:p>
-        </p:txBody>
-      </p:sp>
-      <p:sp>
-        <p:nvSpPr>
-          <p:cNvPr id="2" name="Rectangle Bottom Copyright">
-            <a:extLst>
-              <a:ext uri="{FF2B5EF4-FFF2-40B4-BE49-F238E27FC236}">
-                <a16:creationId xmlns:a16="http://schemas.microsoft.com/office/drawing/2014/main" id="{664812A4-2991-44D1-BFE9-32E55AADF8A5}"/>
-              </a:ext>
-            </a:extLst>
-          </p:cNvPr>
-          <p:cNvSpPr/>
-          <p:nvPr/>
-        </p:nvSpPr>
-        <p:spPr>
-          <a:xfrm>
-            <a:off x="111000" y="6454758"/>
-            <a:ext cx="11970000" cy="304242"/>
-          </a:xfrm>
-          <a:prstGeom prst="rect">
-            <a:avLst/>
-          </a:prstGeom>
-        </p:spPr>
-        <p:txBody>
-          <a:bodyPr wrap="square">
-            <a:noAutofit/>
-          </a:bodyPr>
-          <a:lstStyle/>
-          <a:p>
-            <a:pPr algn="ctr">
-              <a:lnSpc>
-                <a:spcPct val="100000"/>
-              </a:lnSpc>
-              <a:spcBef>
-                <a:spcPts val="0"/>
-              </a:spcBef>
-              <a:spcAft>
-                <a:spcPts val="0"/>
-              </a:spcAft>
-            </a:pPr>
-            <a:r>
-              <a:rPr lang="bg-BG" sz="1600" dirty="0">
-                <a:solidFill>
-                  <a:schemeClr val="bg2"/>
-                </a:solidFill>
-                <a:effectLst/>
-                <a:latin typeface="Calibri" panose="020F0502020204030204" pitchFamily="34" charset="0"/>
-                <a:ea typeface="Calibri" panose="020F0502020204030204" pitchFamily="34" charset="0"/>
-                <a:cs typeface="Arial" panose="020B0604020202020204" pitchFamily="34" charset="0"/>
-              </a:rPr>
-              <a:t>Проект "</a:t>
-            </a:r>
-            <a:r>
-              <a:rPr lang="bg-BG" sz="1600" dirty="0">
-                <a:solidFill>
-                  <a:schemeClr val="bg1">
-                    <a:lumMod val="20000"/>
-                    <a:lumOff val="80000"/>
-                  </a:schemeClr>
-                </a:solidFill>
-                <a:effectLst/>
-                <a:latin typeface="Calibri" panose="020F0502020204030204" pitchFamily="34" charset="0"/>
-                <a:ea typeface="Calibri" panose="020F0502020204030204" pitchFamily="34" charset="0"/>
-                <a:cs typeface="Arial" panose="020B0604020202020204" pitchFamily="34" charset="0"/>
-                <a:hlinkClick r:id="rId3">
-                  <a:extLst>
-                    <a:ext uri="{A12FA001-AC4F-418D-AE19-62706E023703}">
-                      <ahyp:hlinkClr xmlns:ahyp="http://schemas.microsoft.com/office/drawing/2018/hyperlinkcolor" val="tx"/>
-                    </a:ext>
-                  </a:extLst>
-                </a:hlinkClick>
-              </a:rPr>
-              <a:t>Отворено учебно съдържание по програмиране и ИТ</a:t>
-            </a:r>
-            <a:r>
-              <a:rPr lang="bg-BG" sz="1600" dirty="0">
-                <a:solidFill>
-                  <a:schemeClr val="bg2"/>
-                </a:solidFill>
-                <a:effectLst/>
-                <a:latin typeface="Calibri" panose="020F0502020204030204" pitchFamily="34" charset="0"/>
-                <a:ea typeface="Calibri" panose="020F0502020204030204" pitchFamily="34" charset="0"/>
-                <a:cs typeface="Arial" panose="020B0604020202020204" pitchFamily="34" charset="0"/>
-              </a:rPr>
-              <a:t>", СофтУни Фондация (лиценз </a:t>
-            </a:r>
-            <a:r>
-              <a:rPr lang="en-US" sz="1600" dirty="0">
-                <a:solidFill>
-                  <a:schemeClr val="bg2"/>
-                </a:solidFill>
-                <a:effectLst/>
-                <a:latin typeface="Calibri" panose="020F0502020204030204" pitchFamily="34" charset="0"/>
-                <a:ea typeface="Calibri" panose="020F0502020204030204" pitchFamily="34" charset="0"/>
-                <a:cs typeface="Arial" panose="020B0604020202020204" pitchFamily="34" charset="0"/>
-              </a:rPr>
-              <a:t>CC-BY-NC-SA</a:t>
-            </a:r>
-            <a:r>
-              <a:rPr lang="bg-BG" sz="1600" dirty="0">
-                <a:solidFill>
-                  <a:schemeClr val="bg2"/>
-                </a:solidFill>
-                <a:effectLst/>
-                <a:latin typeface="Calibri" panose="020F0502020204030204" pitchFamily="34" charset="0"/>
-                <a:ea typeface="Calibri" panose="020F0502020204030204" pitchFamily="34" charset="0"/>
-                <a:cs typeface="Arial" panose="020B0604020202020204" pitchFamily="34" charset="0"/>
-              </a:rPr>
-              <a:t>)</a:t>
-            </a:r>
-            <a:endParaRPr lang="bg-BG" sz="2400" dirty="0">
-              <a:solidFill>
-                <a:schemeClr val="bg2"/>
-              </a:solidFill>
-              <a:effectLst/>
-              <a:latin typeface="Calibri" panose="020F0502020204030204" pitchFamily="34" charset="0"/>
-              <a:ea typeface="Calibri" panose="020F0502020204030204" pitchFamily="34" charset="0"/>
-              <a:cs typeface="Arial" panose="020B0604020202020204" pitchFamily="34" charset="0"/>
-            </a:endParaRPr>
-          </a:p>
-        </p:txBody>
-      </p:sp>
-    </p:spTree>
-    <p:extLst>
-      <p:ext uri="{BB962C8B-B14F-4D97-AF65-F5344CB8AC3E}">
-        <p14:creationId xmlns:p14="http://schemas.microsoft.com/office/powerpoint/2010/main" val="1472534970"/>
-      </p:ext>
-    </p:extLst>
-  </p:cSld>
-  <p:clrMapOvr>
-    <a:masterClrMapping/>
-  </p:clrMapOvr>
-  <mc:AlternateContent xmlns:mc="http://schemas.openxmlformats.org/markup-compatibility/2006" xmlns:p14="http://schemas.microsoft.com/office/powerpoint/2010/main">
-    <mc:Choice Requires="p14">
-      <p:transition spd="slow" p14:dur="2000" advClick="0" advTm="5000"/>
-    </mc:Choice>
-    <mc:Fallback xmlns="">
-      <p:transition spd="slow" advClick="0" advTm="5000"/>
-    </mc:Fallback>
-  </mc:AlternateContent>
-</p:sld>
-</file>
-
 <file path=ppt/slides/slide4.xml><?xml version="1.0" encoding="utf-8"?>
 <p:sld xmlns:a="http://schemas.openxmlformats.org/drawingml/2006/main" xmlns:r="http://schemas.openxmlformats.org/officeDocument/2006/relationships" xmlns:p="http://schemas.openxmlformats.org/presentationml/2006/main">
   <p:cSld>
@@ -33166,6 +33412,196 @@
 </file>
 
 <file path=ppt/slides/slide40.xml><?xml version="1.0" encoding="utf-8"?>
+<p:sld xmlns:a="http://schemas.openxmlformats.org/drawingml/2006/main" xmlns:r="http://schemas.openxmlformats.org/officeDocument/2006/relationships" xmlns:p="http://schemas.openxmlformats.org/presentationml/2006/main">
+  <p:cSld>
+    <p:spTree>
+      <p:nvGrpSpPr>
+        <p:cNvPr id="1" name=""/>
+        <p:cNvGrpSpPr/>
+        <p:nvPr/>
+      </p:nvGrpSpPr>
+      <p:grpSpPr>
+        <a:xfrm>
+          <a:off x="0" y="0"/>
+          <a:ext cx="0" cy="0"/>
+          <a:chOff x="0" y="0"/>
+          <a:chExt cx="0" cy="0"/>
+        </a:xfrm>
+      </p:grpSpPr>
+      <p:sp>
+        <p:nvSpPr>
+          <p:cNvPr id="5" name="Slide Title">
+            <a:extLst>
+              <a:ext uri="{FF2B5EF4-FFF2-40B4-BE49-F238E27FC236}">
+                <a16:creationId xmlns:a16="http://schemas.microsoft.com/office/drawing/2014/main" id="{FA0703FC-0F8F-4C80-A615-E4B381EC0E0C}"/>
+              </a:ext>
+            </a:extLst>
+          </p:cNvPr>
+          <p:cNvSpPr>
+            <a:spLocks noGrp="1"/>
+          </p:cNvSpPr>
+          <p:nvPr>
+            <p:ph type="title"/>
+          </p:nvPr>
+        </p:nvSpPr>
+        <p:spPr/>
+        <p:txBody>
+          <a:bodyPr/>
+          <a:lstStyle/>
+          <a:p>
+            <a:r>
+              <a:rPr lang="bg-BG" dirty="0"/>
+              <a:t>Въпроси</a:t>
+            </a:r>
+            <a:r>
+              <a:rPr lang="en-US" dirty="0"/>
+              <a:t>?</a:t>
+            </a:r>
+          </a:p>
+        </p:txBody>
+      </p:sp>
+      <p:sp>
+        <p:nvSpPr>
+          <p:cNvPr id="2" name="Rectangle Bottom Copyright">
+            <a:extLst>
+              <a:ext uri="{FF2B5EF4-FFF2-40B4-BE49-F238E27FC236}">
+                <a16:creationId xmlns:a16="http://schemas.microsoft.com/office/drawing/2014/main" id="{664812A4-2991-44D1-BFE9-32E55AADF8A5}"/>
+              </a:ext>
+            </a:extLst>
+          </p:cNvPr>
+          <p:cNvSpPr/>
+          <p:nvPr/>
+        </p:nvSpPr>
+        <p:spPr>
+          <a:xfrm>
+            <a:off x="111000" y="6454758"/>
+            <a:ext cx="11970000" cy="304242"/>
+          </a:xfrm>
+          <a:prstGeom prst="rect">
+            <a:avLst/>
+          </a:prstGeom>
+        </p:spPr>
+        <p:txBody>
+          <a:bodyPr wrap="square">
+            <a:noAutofit/>
+          </a:bodyPr>
+          <a:lstStyle/>
+          <a:p>
+            <a:pPr algn="ctr">
+              <a:lnSpc>
+                <a:spcPct val="100000"/>
+              </a:lnSpc>
+              <a:spcBef>
+                <a:spcPts val="0"/>
+              </a:spcBef>
+              <a:spcAft>
+                <a:spcPts val="0"/>
+              </a:spcAft>
+            </a:pPr>
+            <a:r>
+              <a:rPr lang="bg-BG" sz="1600" dirty="0">
+                <a:solidFill>
+                  <a:schemeClr val="bg2"/>
+                </a:solidFill>
+                <a:effectLst/>
+                <a:latin typeface="Calibri" panose="020F0502020204030204" pitchFamily="34" charset="0"/>
+                <a:ea typeface="Calibri" panose="020F0502020204030204" pitchFamily="34" charset="0"/>
+                <a:cs typeface="Arial" panose="020B0604020202020204" pitchFamily="34" charset="0"/>
+              </a:rPr>
+              <a:t>Проект "</a:t>
+            </a:r>
+            <a:r>
+              <a:rPr lang="bg-BG" sz="1600" dirty="0">
+                <a:solidFill>
+                  <a:schemeClr val="bg1">
+                    <a:lumMod val="20000"/>
+                    <a:lumOff val="80000"/>
+                  </a:schemeClr>
+                </a:solidFill>
+                <a:effectLst/>
+                <a:latin typeface="Calibri" panose="020F0502020204030204" pitchFamily="34" charset="0"/>
+                <a:ea typeface="Calibri" panose="020F0502020204030204" pitchFamily="34" charset="0"/>
+                <a:cs typeface="Arial" panose="020B0604020202020204" pitchFamily="34" charset="0"/>
+                <a:hlinkClick r:id="rId3">
+                  <a:extLst>
+                    <a:ext uri="{A12FA001-AC4F-418D-AE19-62706E023703}">
+                      <ahyp:hlinkClr xmlns:ahyp="http://schemas.microsoft.com/office/drawing/2018/hyperlinkcolor" val="tx"/>
+                    </a:ext>
+                  </a:extLst>
+                </a:hlinkClick>
+              </a:rPr>
+              <a:t>Отворено учебно съдържание по програмиране и ИТ</a:t>
+            </a:r>
+            <a:r>
+              <a:rPr lang="bg-BG" sz="1600" dirty="0">
+                <a:solidFill>
+                  <a:schemeClr val="bg2"/>
+                </a:solidFill>
+                <a:effectLst/>
+                <a:latin typeface="Calibri" panose="020F0502020204030204" pitchFamily="34" charset="0"/>
+                <a:ea typeface="Calibri" panose="020F0502020204030204" pitchFamily="34" charset="0"/>
+                <a:cs typeface="Arial" panose="020B0604020202020204" pitchFamily="34" charset="0"/>
+              </a:rPr>
+              <a:t>", СофтУни Фондация (лиценз </a:t>
+            </a:r>
+            <a:r>
+              <a:rPr lang="en-US" sz="1600" dirty="0">
+                <a:solidFill>
+                  <a:schemeClr val="bg2"/>
+                </a:solidFill>
+                <a:effectLst/>
+                <a:latin typeface="Calibri" panose="020F0502020204030204" pitchFamily="34" charset="0"/>
+                <a:ea typeface="Calibri" panose="020F0502020204030204" pitchFamily="34" charset="0"/>
+                <a:cs typeface="Arial" panose="020B0604020202020204" pitchFamily="34" charset="0"/>
+              </a:rPr>
+              <a:t>CC-BY-NC-SA</a:t>
+            </a:r>
+            <a:r>
+              <a:rPr lang="bg-BG" sz="1600" dirty="0">
+                <a:solidFill>
+                  <a:schemeClr val="bg2"/>
+                </a:solidFill>
+                <a:effectLst/>
+                <a:latin typeface="Calibri" panose="020F0502020204030204" pitchFamily="34" charset="0"/>
+                <a:ea typeface="Calibri" panose="020F0502020204030204" pitchFamily="34" charset="0"/>
+                <a:cs typeface="Arial" panose="020B0604020202020204" pitchFamily="34" charset="0"/>
+              </a:rPr>
+              <a:t>)</a:t>
+            </a:r>
+            <a:endParaRPr lang="bg-BG" sz="2400" dirty="0">
+              <a:solidFill>
+                <a:schemeClr val="bg2"/>
+              </a:solidFill>
+              <a:effectLst/>
+              <a:latin typeface="Calibri" panose="020F0502020204030204" pitchFamily="34" charset="0"/>
+              <a:ea typeface="Calibri" panose="020F0502020204030204" pitchFamily="34" charset="0"/>
+              <a:cs typeface="Arial" panose="020B0604020202020204" pitchFamily="34" charset="0"/>
+            </a:endParaRPr>
+          </a:p>
+        </p:txBody>
+      </p:sp>
+    </p:spTree>
+    <p:extLst>
+      <p:ext uri="{BB962C8B-B14F-4D97-AF65-F5344CB8AC3E}">
+        <p14:creationId xmlns:p14="http://schemas.microsoft.com/office/powerpoint/2010/main" val="1472534970"/>
+      </p:ext>
+    </p:extLst>
+  </p:cSld>
+  <p:clrMapOvr>
+    <a:masterClrMapping/>
+  </p:clrMapOvr>
+  <mc:AlternateContent xmlns:mc="http://schemas.openxmlformats.org/markup-compatibility/2006" xmlns:p14="http://schemas.microsoft.com/office/powerpoint/2010/main">
+    <mc:Choice Requires="p14">
+      <p:transition spd="slow" p14:dur="2000" advClick="0" advTm="5000"/>
+    </mc:Choice>
+    <mc:Fallback xmlns="">
+      <p:transition spd="slow" advClick="0" advTm="5000"/>
+    </mc:Fallback>
+  </mc:AlternateContent>
+</p:sld>
+</file>
+
+<file path=ppt/slides/slide41.xml><?xml version="1.0" encoding="utf-8"?>
 <p:sld xmlns:a="http://schemas.openxmlformats.org/drawingml/2006/main" xmlns:r="http://schemas.openxmlformats.org/officeDocument/2006/relationships" xmlns:p="http://schemas.openxmlformats.org/presentationml/2006/main" show="0">
   <p:cSld>
     <p:spTree>
@@ -33218,7 +33654,7 @@
             <a:fld id="{2BF067CD-8E6B-4360-9AA8-C5DF2A48A6D1}" type="slidenum">
               <a:rPr lang="en-US" smtClean="0"/>
               <a:pPr/>
-              <a:t>40</a:t>
+              <a:t>41</a:t>
             </a:fld>
             <a:endParaRPr lang="en-US" dirty="0"/>
           </a:p>
@@ -33757,7 +34193,7 @@
           <p:nvPr/>
         </p:nvPicPr>
         <p:blipFill rotWithShape="1">
-          <a:blip r:embed="rId2">
+          <a:blip r:embed="rId3">
             <a:extLst>
               <a:ext uri="{28A0092B-C50C-407E-A947-70E740481C1C}">
                 <a14:useLocalDpi xmlns:a14="http://schemas.microsoft.com/office/drawing/2010/main" val="0"/>
@@ -33972,6 +34408,11 @@
       </p:par>
     </p:tnLst>
   </p:timing>
+  <p:extLst>
+    <p:ext uri="{6950BFC3-D8DA-4A85-94F7-54DA5524770B}">
+      <p188:commentRel xmlns:p188="http://schemas.microsoft.com/office/powerpoint/2018/8/main" r:id="rId2"/>
+    </p:ext>
+  </p:extLst>
 </p:sld>
 </file>
 
@@ -34184,7 +34625,7 @@
           <p:nvPr/>
         </p:nvPicPr>
         <p:blipFill rotWithShape="1">
-          <a:blip r:embed="rId2">
+          <a:blip r:embed="rId3">
             <a:extLst>
               <a:ext uri="{28A0092B-C50C-407E-A947-70E740481C1C}">
                 <a14:useLocalDpi xmlns:a14="http://schemas.microsoft.com/office/drawing/2010/main" val="0"/>
@@ -34399,6 +34840,11 @@
       </p:par>
     </p:tnLst>
   </p:timing>
+  <p:extLst>
+    <p:ext uri="{6950BFC3-D8DA-4A85-94F7-54DA5524770B}">
+      <p188:commentRel xmlns:p188="http://schemas.microsoft.com/office/powerpoint/2018/8/main" r:id="rId2"/>
+    </p:ext>
+  </p:extLst>
 </p:sld>
 </file>
 
@@ -34913,6 +35359,11 @@
       </p:par>
     </p:tnLst>
   </p:timing>
+  <p:extLst>
+    <p:ext uri="{6950BFC3-D8DA-4A85-94F7-54DA5524770B}">
+      <p188:commentRel xmlns:p188="http://schemas.microsoft.com/office/powerpoint/2018/8/main" r:id="rId2"/>
+    </p:ext>
+  </p:extLst>
 </p:sld>
 </file>
 

</xml_diff>